<commit_message>
modified:   cherrypy.pptx 	Effective STL.pdf 	spweb.pptx
</commit_message>
<xml_diff>
--- a/cherrypy.pptx
+++ b/cherrypy.pptx
@@ -194,7 +194,7 @@
           <a:p>
             <a:fld id="{1E6EA68C-959A-EC47-82BA-093A9FBFFC8F}" type="datetimeFigureOut">
               <a:rPr lang="en-US" smtClean="0"/>
-              <a:t>2/21/14</a:t>
+              <a:t>2/27/14</a:t>
             </a:fld>
             <a:endParaRPr lang="en-US" dirty="0"/>
           </a:p>
@@ -851,7 +851,7 @@
           <a:p>
             <a:fld id="{AB48B10B-8CF6-8E4E-BA48-763E0B34B95B}" type="datetimeFigureOut">
               <a:rPr lang="en-US" smtClean="0"/>
-              <a:t>2/21/14</a:t>
+              <a:t>2/27/14</a:t>
             </a:fld>
             <a:endParaRPr lang="en-US" dirty="0"/>
           </a:p>
@@ -1021,7 +1021,7 @@
           <a:p>
             <a:fld id="{AB48B10B-8CF6-8E4E-BA48-763E0B34B95B}" type="datetimeFigureOut">
               <a:rPr lang="en-US" smtClean="0"/>
-              <a:t>2/21/14</a:t>
+              <a:t>2/27/14</a:t>
             </a:fld>
             <a:endParaRPr lang="en-US" dirty="0"/>
           </a:p>
@@ -1201,7 +1201,7 @@
           <a:p>
             <a:fld id="{AB48B10B-8CF6-8E4E-BA48-763E0B34B95B}" type="datetimeFigureOut">
               <a:rPr lang="en-US" smtClean="0"/>
-              <a:t>2/21/14</a:t>
+              <a:t>2/27/14</a:t>
             </a:fld>
             <a:endParaRPr lang="en-US" dirty="0"/>
           </a:p>
@@ -1371,7 +1371,7 @@
           <a:p>
             <a:fld id="{AB48B10B-8CF6-8E4E-BA48-763E0B34B95B}" type="datetimeFigureOut">
               <a:rPr lang="en-US" smtClean="0"/>
-              <a:t>2/21/14</a:t>
+              <a:t>2/27/14</a:t>
             </a:fld>
             <a:endParaRPr lang="en-US" dirty="0"/>
           </a:p>
@@ -1617,7 +1617,7 @@
           <a:p>
             <a:fld id="{AB48B10B-8CF6-8E4E-BA48-763E0B34B95B}" type="datetimeFigureOut">
               <a:rPr lang="en-US" smtClean="0"/>
-              <a:t>2/21/14</a:t>
+              <a:t>2/27/14</a:t>
             </a:fld>
             <a:endParaRPr lang="en-US" dirty="0"/>
           </a:p>
@@ -1905,7 +1905,7 @@
           <a:p>
             <a:fld id="{AB48B10B-8CF6-8E4E-BA48-763E0B34B95B}" type="datetimeFigureOut">
               <a:rPr lang="en-US" smtClean="0"/>
-              <a:t>2/21/14</a:t>
+              <a:t>2/27/14</a:t>
             </a:fld>
             <a:endParaRPr lang="en-US" dirty="0"/>
           </a:p>
@@ -2327,7 +2327,7 @@
           <a:p>
             <a:fld id="{AB48B10B-8CF6-8E4E-BA48-763E0B34B95B}" type="datetimeFigureOut">
               <a:rPr lang="en-US" smtClean="0"/>
-              <a:t>2/21/14</a:t>
+              <a:t>2/27/14</a:t>
             </a:fld>
             <a:endParaRPr lang="en-US" dirty="0"/>
           </a:p>
@@ -2445,7 +2445,7 @@
           <a:p>
             <a:fld id="{AB48B10B-8CF6-8E4E-BA48-763E0B34B95B}" type="datetimeFigureOut">
               <a:rPr lang="en-US" smtClean="0"/>
-              <a:t>2/21/14</a:t>
+              <a:t>2/27/14</a:t>
             </a:fld>
             <a:endParaRPr lang="en-US" dirty="0"/>
           </a:p>
@@ -2540,7 +2540,7 @@
           <a:p>
             <a:fld id="{AB48B10B-8CF6-8E4E-BA48-763E0B34B95B}" type="datetimeFigureOut">
               <a:rPr lang="en-US" smtClean="0"/>
-              <a:t>2/21/14</a:t>
+              <a:t>2/27/14</a:t>
             </a:fld>
             <a:endParaRPr lang="en-US" dirty="0"/>
           </a:p>
@@ -2817,7 +2817,7 @@
           <a:p>
             <a:fld id="{AB48B10B-8CF6-8E4E-BA48-763E0B34B95B}" type="datetimeFigureOut">
               <a:rPr lang="en-US" smtClean="0"/>
-              <a:t>2/21/14</a:t>
+              <a:t>2/27/14</a:t>
             </a:fld>
             <a:endParaRPr lang="en-US" dirty="0"/>
           </a:p>
@@ -3070,7 +3070,7 @@
           <a:p>
             <a:fld id="{AB48B10B-8CF6-8E4E-BA48-763E0B34B95B}" type="datetimeFigureOut">
               <a:rPr lang="en-US" smtClean="0"/>
-              <a:t>2/21/14</a:t>
+              <a:t>2/27/14</a:t>
             </a:fld>
             <a:endParaRPr lang="en-US" dirty="0"/>
           </a:p>
@@ -3283,7 +3283,7 @@
           <a:p>
             <a:fld id="{AB48B10B-8CF6-8E4E-BA48-763E0B34B95B}" type="datetimeFigureOut">
               <a:rPr lang="en-US" smtClean="0"/>
-              <a:t>2/21/14</a:t>
+              <a:t>2/27/14</a:t>
             </a:fld>
             <a:endParaRPr lang="en-US" dirty="0"/>
           </a:p>
@@ -6448,8 +6448,8 @@
         </p:nvSpPr>
         <p:spPr>
           <a:xfrm>
-            <a:off x="3709215" y="3710409"/>
-            <a:ext cx="1140063" cy="347799"/>
+            <a:off x="3709215" y="3571909"/>
+            <a:ext cx="1140063" cy="486299"/>
           </a:xfrm>
           <a:prstGeom prst="roundRect">
             <a:avLst/>
@@ -6487,8 +6487,8 @@
         </p:nvSpPr>
         <p:spPr>
           <a:xfrm>
-            <a:off x="3709215" y="3710409"/>
-            <a:ext cx="1140063" cy="307777"/>
+            <a:off x="3709215" y="3571909"/>
+            <a:ext cx="1140064" cy="523220"/>
           </a:xfrm>
           <a:prstGeom prst="rect">
             <a:avLst/>
@@ -6504,7 +6504,7 @@
             <a:pPr algn="ctr"/>
             <a:r>
               <a:rPr lang="en-US" sz="1400" dirty="0" smtClean="0"/>
-              <a:t>Application</a:t>
+              <a:t>Specific Application</a:t>
             </a:r>
             <a:endParaRPr lang="en-US" sz="1400" dirty="0"/>
           </a:p>
@@ -6618,7 +6618,7 @@
         <p:spPr>
           <a:xfrm flipH="1" flipV="1">
             <a:off x="2666550" y="3123061"/>
-            <a:ext cx="1612697" cy="587348"/>
+            <a:ext cx="1612697" cy="448848"/>
           </a:xfrm>
           <a:prstGeom prst="straightConnector1">
             <a:avLst/>
@@ -7181,8 +7181,8 @@
         </p:nvCxnSpPr>
         <p:spPr>
           <a:xfrm rot="5400000">
-            <a:off x="6148270" y="1799308"/>
-            <a:ext cx="786009" cy="3383992"/>
+            <a:off x="6182895" y="1764683"/>
+            <a:ext cx="716759" cy="3383992"/>
           </a:xfrm>
           <a:prstGeom prst="curvedConnector2">
             <a:avLst/>
@@ -7214,8 +7214,8 @@
         </p:nvSpPr>
         <p:spPr>
           <a:xfrm>
-            <a:off x="6148536" y="3433410"/>
-            <a:ext cx="1109682" cy="276999"/>
+            <a:off x="5698027" y="3294910"/>
+            <a:ext cx="2103835" cy="276999"/>
           </a:xfrm>
           <a:prstGeom prst="rect">
             <a:avLst/>
@@ -7230,7 +7230,15 @@
           <a:p>
             <a:r>
               <a:rPr lang="en-US" sz="1200" dirty="0" smtClean="0"/>
-              <a:t>6) get_serving</a:t>
+              <a:t>6) </a:t>
+            </a:r>
+            <a:r>
+              <a:rPr lang="en-US" sz="1200" dirty="0" err="1" smtClean="0"/>
+              <a:t>get_serving</a:t>
+            </a:r>
+            <a:r>
+              <a:rPr lang="en-US" sz="1200" dirty="0" smtClean="0"/>
+              <a:t> (URL matters)</a:t>
             </a:r>
             <a:endParaRPr lang="en-US" sz="1200" dirty="0"/>
           </a:p>
@@ -7246,8 +7254,8 @@
         </p:nvCxnSpPr>
         <p:spPr>
           <a:xfrm flipH="1" flipV="1">
-            <a:off x="1872258" y="3636624"/>
-            <a:ext cx="1836957" cy="227674"/>
+            <a:off x="1807951" y="3498125"/>
+            <a:ext cx="1901264" cy="335394"/>
           </a:xfrm>
           <a:prstGeom prst="straightConnector1">
             <a:avLst/>
@@ -7283,8 +7291,8 @@
         </p:nvCxnSpPr>
         <p:spPr>
           <a:xfrm flipH="1">
-            <a:off x="1619672" y="3884309"/>
-            <a:ext cx="2089543" cy="1142137"/>
+            <a:off x="1619672" y="3815059"/>
+            <a:ext cx="2089543" cy="1211387"/>
           </a:xfrm>
           <a:prstGeom prst="straightConnector1">
             <a:avLst/>
@@ -7350,8 +7358,8 @@
         </p:nvCxnSpPr>
         <p:spPr>
           <a:xfrm>
-            <a:off x="4849278" y="3884309"/>
-            <a:ext cx="1299258" cy="1082691"/>
+            <a:off x="4849278" y="3815059"/>
+            <a:ext cx="1299258" cy="1151941"/>
           </a:xfrm>
           <a:prstGeom prst="straightConnector1">
             <a:avLst/>
@@ -7536,14 +7544,26 @@
           <a:lstStyle/>
           <a:p>
             <a:r>
-              <a:rPr lang="en-US" sz="1200" dirty="0"/>
+              <a:rPr lang="en-US" sz="1200" b="1" dirty="0">
+                <a:solidFill>
+                  <a:srgbClr val="FF6600"/>
+                </a:solidFill>
+              </a:rPr>
               <a:t>8</a:t>
             </a:r>
             <a:r>
-              <a:rPr lang="en-US" sz="1200" dirty="0" smtClean="0"/>
+              <a:rPr lang="en-US" sz="1200" b="1" dirty="0" smtClean="0">
+                <a:solidFill>
+                  <a:srgbClr val="FF6600"/>
+                </a:solidFill>
+              </a:rPr>
               <a:t>) run</a:t>
             </a:r>
-            <a:endParaRPr lang="en-US" sz="1200" dirty="0"/>
+            <a:endParaRPr lang="en-US" sz="1200" b="1" dirty="0">
+              <a:solidFill>
+                <a:srgbClr val="FF6600"/>
+              </a:solidFill>
+            </a:endParaRPr>
           </a:p>
         </p:txBody>
       </p:sp>

</xml_diff>